<commit_message>
file deleted for subsys
</commit_message>
<xml_diff>
--- a/praesentatio/HYDRA.pptx
+++ b/praesentatio/HYDRA.pptx
@@ -6,8 +6,17 @@
   </p:sldMasterIdLst>
   <p:sldIdLst>
     <p:sldId id="257" r:id="rId2"/>
-    <p:sldId id="275" r:id="rId3"/>
-    <p:sldId id="276" r:id="rId4"/>
+    <p:sldId id="277" r:id="rId3"/>
+    <p:sldId id="275" r:id="rId4"/>
+    <p:sldId id="278" r:id="rId5"/>
+    <p:sldId id="279" r:id="rId6"/>
+    <p:sldId id="280" r:id="rId7"/>
+    <p:sldId id="281" r:id="rId8"/>
+    <p:sldId id="282" r:id="rId9"/>
+    <p:sldId id="284" r:id="rId10"/>
+    <p:sldId id="285" r:id="rId11"/>
+    <p:sldId id="276" r:id="rId12"/>
+    <p:sldId id="283" r:id="rId13"/>
   </p:sldIdLst>
   <p:sldSz cx="12192000" cy="6858000"/>
   <p:notesSz cx="6858000" cy="9144000"/>
@@ -3523,7 +3532,7 @@
 </p:sld>
 </file>
 
-<file path=ppt/slides/slide2.xml><?xml version="1.0" encoding="utf-8"?>
+<file path=ppt/slides/slide10.xml><?xml version="1.0" encoding="utf-8"?>
 <p:sld xmlns:a="http://schemas.openxmlformats.org/drawingml/2006/main" xmlns:r="http://schemas.openxmlformats.org/officeDocument/2006/relationships" xmlns:p="http://schemas.openxmlformats.org/presentationml/2006/main">
   <p:cSld>
     <p:spTree>
@@ -3555,7 +3564,7 @@
         <p:spPr>
           <a:xfrm>
             <a:off x="226503" y="192947"/>
-            <a:ext cx="1034257" cy="646331"/>
+            <a:ext cx="3199915" cy="646331"/>
           </a:xfrm>
           <a:prstGeom prst="rect">
             <a:avLst/>
@@ -3568,7 +3577,7 @@
           <a:lstStyle/>
           <a:p>
             <a:r>
-              <a:rPr lang="en-US" sz="3600" b="1" dirty="0">
+              <a:rPr lang="ru-RU" sz="3600" b="1" dirty="0">
                 <a:solidFill>
                   <a:schemeClr val="tx1">
                     <a:lumMod val="50000"/>
@@ -3577,17 +3586,8 @@
                 </a:solidFill>
                 <a:latin typeface="Montserrat" panose="00000500000000000000" pitchFamily="2" charset="-52"/>
               </a:rPr>
-              <a:t>Title</a:t>
-            </a:r>
-            <a:endParaRPr lang="ru-RU" sz="3600" b="1" dirty="0">
-              <a:solidFill>
-                <a:schemeClr val="tx1">
-                  <a:lumMod val="50000"/>
-                  <a:lumOff val="50000"/>
-                </a:schemeClr>
-              </a:solidFill>
-              <a:latin typeface="Montserrat" panose="00000500000000000000" pitchFamily="2" charset="-52"/>
-            </a:endParaRPr>
+              <a:t>Наше решение</a:t>
+            </a:r>
           </a:p>
         </p:txBody>
       </p:sp>
@@ -3606,7 +3606,7 @@
         <p:spPr>
           <a:xfrm>
             <a:off x="791029" y="1757260"/>
-            <a:ext cx="10609942" cy="671851"/>
+            <a:ext cx="5304971" cy="3257174"/>
           </a:xfrm>
           <a:prstGeom prst="rect">
             <a:avLst/>
@@ -3625,21 +3625,60 @@
               </a:lnSpc>
             </a:pPr>
             <a:r>
-              <a:rPr lang="en-US" sz="2800" dirty="0">
+              <a:rPr lang="ru-RU" sz="2800" dirty="0">
                 <a:latin typeface="Montserrat" panose="00000500000000000000" pitchFamily="2" charset="-52"/>
               </a:rPr>
-              <a:t>text</a:t>
-            </a:r>
-            <a:endParaRPr lang="ru-RU" sz="2800" dirty="0">
-              <a:latin typeface="Montserrat" panose="00000500000000000000" pitchFamily="2" charset="-52"/>
-            </a:endParaRPr>
-          </a:p>
-        </p:txBody>
-      </p:sp>
+              <a:t>Приятным бонусом стало наше </a:t>
+            </a:r>
+            <a:r>
+              <a:rPr lang="ru-RU" sz="2800" dirty="0" err="1">
+                <a:latin typeface="Montserrat" panose="00000500000000000000" pitchFamily="2" charset="-52"/>
+              </a:rPr>
+              <a:t>Android</a:t>
+            </a:r>
+            <a:r>
+              <a:rPr lang="ru-RU" sz="2800" dirty="0">
+                <a:latin typeface="Montserrat" panose="00000500000000000000" pitchFamily="2" charset="-52"/>
+              </a:rPr>
+              <a:t> приложение с личным кабинетом, расписанием и возможностью отправить фидбек используя приложения.</a:t>
+            </a:r>
+          </a:p>
+        </p:txBody>
+      </p:sp>
+      <p:pic>
+        <p:nvPicPr>
+          <p:cNvPr id="3" name="Рисунок 2">
+            <a:extLst>
+              <a:ext uri="{FF2B5EF4-FFF2-40B4-BE49-F238E27FC236}">
+                <a16:creationId xmlns:a16="http://schemas.microsoft.com/office/drawing/2014/main" id="{DD5471B4-C7AC-41D3-A0F7-04D112DE6209}"/>
+              </a:ext>
+            </a:extLst>
+          </p:cNvPr>
+          <p:cNvPicPr>
+            <a:picLocks noChangeAspect="1"/>
+          </p:cNvPicPr>
+          <p:nvPr/>
+        </p:nvPicPr>
+        <p:blipFill>
+          <a:blip r:embed="rId2"/>
+          <a:stretch>
+            <a:fillRect/>
+          </a:stretch>
+        </p:blipFill>
+        <p:spPr>
+          <a:xfrm>
+            <a:off x="7971971" y="0"/>
+            <a:ext cx="3429000" cy="6858000"/>
+          </a:xfrm>
+          <a:prstGeom prst="rect">
+            <a:avLst/>
+          </a:prstGeom>
+        </p:spPr>
+      </p:pic>
     </p:spTree>
     <p:extLst>
       <p:ext uri="{BB962C8B-B14F-4D97-AF65-F5344CB8AC3E}">
-        <p14:creationId xmlns:p14="http://schemas.microsoft.com/office/powerpoint/2010/main" val="3481548332"/>
+        <p14:creationId xmlns:p14="http://schemas.microsoft.com/office/powerpoint/2010/main" val="164046037"/>
       </p:ext>
     </p:extLst>
   </p:cSld>
@@ -3670,7 +3709,544 @@
                             </p:stCondLst>
                             <p:childTnLst>
                               <p:par>
-                                <p:cTn id="5" presetID="10" presetClass="entr" presetSubtype="0" fill="hold" grpId="0" nodeType="afterEffect">
+                                <p:cTn id="5" presetID="10" presetClass="entr" presetSubtype="0" fill="hold" nodeType="withEffect">
+                                  <p:stCondLst>
+                                    <p:cond delay="0"/>
+                                  </p:stCondLst>
+                                  <p:childTnLst>
+                                    <p:set>
+                                      <p:cBhvr>
+                                        <p:cTn id="6" dur="1" fill="hold">
+                                          <p:stCondLst>
+                                            <p:cond delay="0"/>
+                                          </p:stCondLst>
+                                        </p:cTn>
+                                        <p:tgtEl>
+                                          <p:spTgt spid="3"/>
+                                        </p:tgtEl>
+                                        <p:attrNameLst>
+                                          <p:attrName>style.visibility</p:attrName>
+                                        </p:attrNameLst>
+                                      </p:cBhvr>
+                                      <p:to>
+                                        <p:strVal val="visible"/>
+                                      </p:to>
+                                    </p:set>
+                                    <p:animEffect transition="in" filter="fade">
+                                      <p:cBhvr>
+                                        <p:cTn id="7" dur="500"/>
+                                        <p:tgtEl>
+                                          <p:spTgt spid="3"/>
+                                        </p:tgtEl>
+                                      </p:cBhvr>
+                                    </p:animEffect>
+                                  </p:childTnLst>
+                                </p:cTn>
+                              </p:par>
+                            </p:childTnLst>
+                          </p:cTn>
+                        </p:par>
+                      </p:childTnLst>
+                    </p:cTn>
+                  </p:par>
+                </p:childTnLst>
+              </p:cTn>
+              <p:prevCondLst>
+                <p:cond evt="onPrev" delay="0">
+                  <p:tgtEl>
+                    <p:sldTgt/>
+                  </p:tgtEl>
+                </p:cond>
+              </p:prevCondLst>
+              <p:nextCondLst>
+                <p:cond evt="onNext" delay="0">
+                  <p:tgtEl>
+                    <p:sldTgt/>
+                  </p:tgtEl>
+                </p:cond>
+              </p:nextCondLst>
+            </p:seq>
+          </p:childTnLst>
+        </p:cTn>
+      </p:par>
+    </p:tnLst>
+  </p:timing>
+</p:sld>
+</file>
+
+<file path=ppt/slides/slide11.xml><?xml version="1.0" encoding="utf-8"?>
+<p:sld xmlns:a="http://schemas.openxmlformats.org/drawingml/2006/main" xmlns:r="http://schemas.openxmlformats.org/officeDocument/2006/relationships" xmlns:p="http://schemas.openxmlformats.org/presentationml/2006/main">
+  <p:cSld>
+    <p:spTree>
+      <p:nvGrpSpPr>
+        <p:cNvPr id="1" name=""/>
+        <p:cNvGrpSpPr/>
+        <p:nvPr/>
+      </p:nvGrpSpPr>
+      <p:grpSpPr>
+        <a:xfrm>
+          <a:off x="0" y="0"/>
+          <a:ext cx="0" cy="0"/>
+          <a:chOff x="0" y="0"/>
+          <a:chExt cx="0" cy="0"/>
+        </a:xfrm>
+      </p:grpSpPr>
+      <p:sp>
+        <p:nvSpPr>
+          <p:cNvPr id="4" name="Прямоугольник 3">
+            <a:extLst>
+              <a:ext uri="{FF2B5EF4-FFF2-40B4-BE49-F238E27FC236}">
+                <a16:creationId xmlns:a16="http://schemas.microsoft.com/office/drawing/2014/main" id="{D744DC60-29D7-4107-BF24-9CA85085F51D}"/>
+              </a:ext>
+            </a:extLst>
+          </p:cNvPr>
+          <p:cNvSpPr/>
+          <p:nvPr/>
+        </p:nvSpPr>
+        <p:spPr>
+          <a:xfrm>
+            <a:off x="4429005" y="3105834"/>
+            <a:ext cx="3333990" cy="646331"/>
+          </a:xfrm>
+          <a:prstGeom prst="rect">
+            <a:avLst/>
+          </a:prstGeom>
+        </p:spPr>
+        <p:txBody>
+          <a:bodyPr wrap="none">
+            <a:spAutoFit/>
+          </a:bodyPr>
+          <a:lstStyle/>
+          <a:p>
+            <a:pPr algn="ctr"/>
+            <a:r>
+              <a:rPr lang="ru-RU" sz="3600" b="1" dirty="0">
+                <a:solidFill>
+                  <a:schemeClr val="tx1">
+                    <a:lumMod val="50000"/>
+                    <a:lumOff val="50000"/>
+                  </a:schemeClr>
+                </a:solidFill>
+                <a:latin typeface="Montserrat" panose="00000500000000000000" pitchFamily="2" charset="-52"/>
+              </a:rPr>
+              <a:t>Вопросы судей</a:t>
+            </a:r>
+          </a:p>
+        </p:txBody>
+      </p:sp>
+    </p:spTree>
+    <p:extLst>
+      <p:ext uri="{BB962C8B-B14F-4D97-AF65-F5344CB8AC3E}">
+        <p14:creationId xmlns:p14="http://schemas.microsoft.com/office/powerpoint/2010/main" val="2298706615"/>
+      </p:ext>
+    </p:extLst>
+  </p:cSld>
+  <p:clrMapOvr>
+    <a:masterClrMapping/>
+  </p:clrMapOvr>
+  <p:timing>
+    <p:tnLst>
+      <p:par>
+        <p:cTn id="1" dur="indefinite" restart="never" nodeType="tmRoot">
+          <p:childTnLst>
+            <p:seq concurrent="1" nextAc="seek">
+              <p:cTn id="2" dur="indefinite" nodeType="mainSeq">
+                <p:childTnLst>
+                  <p:par>
+                    <p:cTn id="3" fill="hold">
+                      <p:stCondLst>
+                        <p:cond delay="indefinite"/>
+                        <p:cond evt="onBegin" delay="0">
+                          <p:tn val="2"/>
+                        </p:cond>
+                      </p:stCondLst>
+                      <p:childTnLst>
+                        <p:par>
+                          <p:cTn id="4" fill="hold">
+                            <p:stCondLst>
+                              <p:cond delay="0"/>
+                            </p:stCondLst>
+                            <p:childTnLst>
+                              <p:par>
+                                <p:cTn id="5" presetID="10" presetClass="entr" presetSubtype="0" fill="hold" grpId="0" nodeType="withEffect">
+                                  <p:stCondLst>
+                                    <p:cond delay="0"/>
+                                  </p:stCondLst>
+                                  <p:childTnLst>
+                                    <p:set>
+                                      <p:cBhvr>
+                                        <p:cTn id="6" dur="1" fill="hold">
+                                          <p:stCondLst>
+                                            <p:cond delay="0"/>
+                                          </p:stCondLst>
+                                        </p:cTn>
+                                        <p:tgtEl>
+                                          <p:spTgt spid="4"/>
+                                        </p:tgtEl>
+                                        <p:attrNameLst>
+                                          <p:attrName>style.visibility</p:attrName>
+                                        </p:attrNameLst>
+                                      </p:cBhvr>
+                                      <p:to>
+                                        <p:strVal val="visible"/>
+                                      </p:to>
+                                    </p:set>
+                                    <p:animEffect transition="in" filter="fade">
+                                      <p:cBhvr>
+                                        <p:cTn id="7" dur="500"/>
+                                        <p:tgtEl>
+                                          <p:spTgt spid="4"/>
+                                        </p:tgtEl>
+                                      </p:cBhvr>
+                                    </p:animEffect>
+                                  </p:childTnLst>
+                                </p:cTn>
+                              </p:par>
+                            </p:childTnLst>
+                          </p:cTn>
+                        </p:par>
+                      </p:childTnLst>
+                    </p:cTn>
+                  </p:par>
+                </p:childTnLst>
+              </p:cTn>
+              <p:prevCondLst>
+                <p:cond evt="onPrev" delay="0">
+                  <p:tgtEl>
+                    <p:sldTgt/>
+                  </p:tgtEl>
+                </p:cond>
+              </p:prevCondLst>
+              <p:nextCondLst>
+                <p:cond evt="onNext" delay="0">
+                  <p:tgtEl>
+                    <p:sldTgt/>
+                  </p:tgtEl>
+                </p:cond>
+              </p:nextCondLst>
+            </p:seq>
+          </p:childTnLst>
+        </p:cTn>
+      </p:par>
+    </p:tnLst>
+    <p:bldLst>
+      <p:bldP spid="4" grpId="0"/>
+    </p:bldLst>
+  </p:timing>
+</p:sld>
+</file>
+
+<file path=ppt/slides/slide12.xml><?xml version="1.0" encoding="utf-8"?>
+<p:sld xmlns:a="http://schemas.openxmlformats.org/drawingml/2006/main" xmlns:r="http://schemas.openxmlformats.org/officeDocument/2006/relationships" xmlns:p="http://schemas.openxmlformats.org/presentationml/2006/main">
+  <p:cSld>
+    <p:spTree>
+      <p:nvGrpSpPr>
+        <p:cNvPr id="1" name=""/>
+        <p:cNvGrpSpPr/>
+        <p:nvPr/>
+      </p:nvGrpSpPr>
+      <p:grpSpPr>
+        <a:xfrm>
+          <a:off x="0" y="0"/>
+          <a:ext cx="0" cy="0"/>
+          <a:chOff x="0" y="0"/>
+          <a:chExt cx="0" cy="0"/>
+        </a:xfrm>
+      </p:grpSpPr>
+      <p:sp>
+        <p:nvSpPr>
+          <p:cNvPr id="4" name="Прямоугольник 3">
+            <a:extLst>
+              <a:ext uri="{FF2B5EF4-FFF2-40B4-BE49-F238E27FC236}">
+                <a16:creationId xmlns:a16="http://schemas.microsoft.com/office/drawing/2014/main" id="{D744DC60-29D7-4107-BF24-9CA85085F51D}"/>
+              </a:ext>
+            </a:extLst>
+          </p:cNvPr>
+          <p:cNvSpPr/>
+          <p:nvPr/>
+        </p:nvSpPr>
+        <p:spPr>
+          <a:xfrm>
+            <a:off x="3777903" y="3105834"/>
+            <a:ext cx="4636206" cy="646331"/>
+          </a:xfrm>
+          <a:prstGeom prst="rect">
+            <a:avLst/>
+          </a:prstGeom>
+        </p:spPr>
+        <p:txBody>
+          <a:bodyPr wrap="none">
+            <a:spAutoFit/>
+          </a:bodyPr>
+          <a:lstStyle/>
+          <a:p>
+            <a:pPr algn="ctr"/>
+            <a:r>
+              <a:rPr lang="ru-RU" sz="3600" b="1" dirty="0">
+                <a:solidFill>
+                  <a:schemeClr val="tx1">
+                    <a:lumMod val="50000"/>
+                    <a:lumOff val="50000"/>
+                  </a:schemeClr>
+                </a:solidFill>
+                <a:latin typeface="Montserrat" panose="00000500000000000000" pitchFamily="2" charset="-52"/>
+              </a:rPr>
+              <a:t>Спасибо за внимание</a:t>
+            </a:r>
+          </a:p>
+        </p:txBody>
+      </p:sp>
+    </p:spTree>
+    <p:extLst>
+      <p:ext uri="{BB962C8B-B14F-4D97-AF65-F5344CB8AC3E}">
+        <p14:creationId xmlns:p14="http://schemas.microsoft.com/office/powerpoint/2010/main" val="1699585971"/>
+      </p:ext>
+    </p:extLst>
+  </p:cSld>
+  <p:clrMapOvr>
+    <a:masterClrMapping/>
+  </p:clrMapOvr>
+  <p:timing>
+    <p:tnLst>
+      <p:par>
+        <p:cTn id="1" dur="indefinite" restart="never" nodeType="tmRoot">
+          <p:childTnLst>
+            <p:seq concurrent="1" nextAc="seek">
+              <p:cTn id="2" dur="indefinite" nodeType="mainSeq">
+                <p:childTnLst>
+                  <p:par>
+                    <p:cTn id="3" fill="hold">
+                      <p:stCondLst>
+                        <p:cond delay="indefinite"/>
+                        <p:cond evt="onBegin" delay="0">
+                          <p:tn val="2"/>
+                        </p:cond>
+                      </p:stCondLst>
+                      <p:childTnLst>
+                        <p:par>
+                          <p:cTn id="4" fill="hold">
+                            <p:stCondLst>
+                              <p:cond delay="0"/>
+                            </p:stCondLst>
+                            <p:childTnLst>
+                              <p:par>
+                                <p:cTn id="5" presetID="10" presetClass="entr" presetSubtype="0" fill="hold" grpId="0" nodeType="withEffect">
+                                  <p:stCondLst>
+                                    <p:cond delay="0"/>
+                                  </p:stCondLst>
+                                  <p:childTnLst>
+                                    <p:set>
+                                      <p:cBhvr>
+                                        <p:cTn id="6" dur="1" fill="hold">
+                                          <p:stCondLst>
+                                            <p:cond delay="0"/>
+                                          </p:stCondLst>
+                                        </p:cTn>
+                                        <p:tgtEl>
+                                          <p:spTgt spid="4"/>
+                                        </p:tgtEl>
+                                        <p:attrNameLst>
+                                          <p:attrName>style.visibility</p:attrName>
+                                        </p:attrNameLst>
+                                      </p:cBhvr>
+                                      <p:to>
+                                        <p:strVal val="visible"/>
+                                      </p:to>
+                                    </p:set>
+                                    <p:animEffect transition="in" filter="fade">
+                                      <p:cBhvr>
+                                        <p:cTn id="7" dur="500"/>
+                                        <p:tgtEl>
+                                          <p:spTgt spid="4"/>
+                                        </p:tgtEl>
+                                      </p:cBhvr>
+                                    </p:animEffect>
+                                  </p:childTnLst>
+                                </p:cTn>
+                              </p:par>
+                            </p:childTnLst>
+                          </p:cTn>
+                        </p:par>
+                      </p:childTnLst>
+                    </p:cTn>
+                  </p:par>
+                </p:childTnLst>
+              </p:cTn>
+              <p:prevCondLst>
+                <p:cond evt="onPrev" delay="0">
+                  <p:tgtEl>
+                    <p:sldTgt/>
+                  </p:tgtEl>
+                </p:cond>
+              </p:prevCondLst>
+              <p:nextCondLst>
+                <p:cond evt="onNext" delay="0">
+                  <p:tgtEl>
+                    <p:sldTgt/>
+                  </p:tgtEl>
+                </p:cond>
+              </p:nextCondLst>
+            </p:seq>
+          </p:childTnLst>
+        </p:cTn>
+      </p:par>
+    </p:tnLst>
+    <p:bldLst>
+      <p:bldP spid="4" grpId="0"/>
+    </p:bldLst>
+  </p:timing>
+</p:sld>
+</file>
+
+<file path=ppt/slides/slide2.xml><?xml version="1.0" encoding="utf-8"?>
+<p:sld xmlns:a="http://schemas.openxmlformats.org/drawingml/2006/main" xmlns:r="http://schemas.openxmlformats.org/officeDocument/2006/relationships" xmlns:p="http://schemas.openxmlformats.org/presentationml/2006/main">
+  <p:cSld>
+    <p:spTree>
+      <p:nvGrpSpPr>
+        <p:cNvPr id="1" name=""/>
+        <p:cNvGrpSpPr/>
+        <p:nvPr/>
+      </p:nvGrpSpPr>
+      <p:grpSpPr>
+        <a:xfrm>
+          <a:off x="0" y="0"/>
+          <a:ext cx="0" cy="0"/>
+          <a:chOff x="0" y="0"/>
+          <a:chExt cx="0" cy="0"/>
+        </a:xfrm>
+      </p:grpSpPr>
+      <p:sp>
+        <p:nvSpPr>
+          <p:cNvPr id="4" name="Прямоугольник 3">
+            <a:extLst>
+              <a:ext uri="{FF2B5EF4-FFF2-40B4-BE49-F238E27FC236}">
+                <a16:creationId xmlns:a16="http://schemas.microsoft.com/office/drawing/2014/main" id="{D744DC60-29D7-4107-BF24-9CA85085F51D}"/>
+              </a:ext>
+            </a:extLst>
+          </p:cNvPr>
+          <p:cNvSpPr/>
+          <p:nvPr/>
+        </p:nvSpPr>
+        <p:spPr>
+          <a:xfrm>
+            <a:off x="226503" y="192947"/>
+            <a:ext cx="1614545" cy="646331"/>
+          </a:xfrm>
+          <a:prstGeom prst="rect">
+            <a:avLst/>
+          </a:prstGeom>
+        </p:spPr>
+        <p:txBody>
+          <a:bodyPr wrap="none">
+            <a:spAutoFit/>
+          </a:bodyPr>
+          <a:lstStyle/>
+          <a:p>
+            <a:r>
+              <a:rPr lang="ru-RU" sz="3600" b="1" dirty="0">
+                <a:solidFill>
+                  <a:schemeClr val="tx1">
+                    <a:lumMod val="50000"/>
+                    <a:lumOff val="50000"/>
+                  </a:schemeClr>
+                </a:solidFill>
+                <a:latin typeface="Montserrat" panose="00000500000000000000" pitchFamily="2" charset="-52"/>
+              </a:rPr>
+              <a:t>Задачи</a:t>
+            </a:r>
+          </a:p>
+        </p:txBody>
+      </p:sp>
+      <p:sp>
+        <p:nvSpPr>
+          <p:cNvPr id="2" name="TextBox 1">
+            <a:extLst>
+              <a:ext uri="{FF2B5EF4-FFF2-40B4-BE49-F238E27FC236}">
+                <a16:creationId xmlns:a16="http://schemas.microsoft.com/office/drawing/2014/main" id="{0103A899-6D10-49E9-8A51-97CA9380A77D}"/>
+              </a:ext>
+            </a:extLst>
+          </p:cNvPr>
+          <p:cNvSpPr txBox="1"/>
+          <p:nvPr/>
+        </p:nvSpPr>
+        <p:spPr>
+          <a:xfrm>
+            <a:off x="791029" y="1757260"/>
+            <a:ext cx="10609942" cy="1318181"/>
+          </a:xfrm>
+          <a:prstGeom prst="rect">
+            <a:avLst/>
+          </a:prstGeom>
+          <a:noFill/>
+        </p:spPr>
+        <p:txBody>
+          <a:bodyPr wrap="square" rtlCol="0">
+            <a:spAutoFit/>
+          </a:bodyPr>
+          <a:lstStyle/>
+          <a:p>
+            <a:pPr>
+              <a:lnSpc>
+                <a:spcPct val="150000"/>
+              </a:lnSpc>
+            </a:pPr>
+            <a:r>
+              <a:rPr lang="ru-RU" sz="2800" dirty="0">
+                <a:latin typeface="Montserrat" panose="00000500000000000000" pitchFamily="2" charset="-52"/>
+              </a:rPr>
+              <a:t>№ 2. «Система обратной связи по качеству образования» </a:t>
+            </a:r>
+          </a:p>
+          <a:p>
+            <a:pPr>
+              <a:lnSpc>
+                <a:spcPct val="150000"/>
+              </a:lnSpc>
+            </a:pPr>
+            <a:r>
+              <a:rPr lang="ru-RU" sz="2800" dirty="0">
+                <a:latin typeface="Montserrat" panose="00000500000000000000" pitchFamily="2" charset="-52"/>
+              </a:rPr>
+              <a:t>№ 1. «Мобильное приложение “Мой физтех”»</a:t>
+            </a:r>
+          </a:p>
+        </p:txBody>
+      </p:sp>
+    </p:spTree>
+    <p:extLst>
+      <p:ext uri="{BB962C8B-B14F-4D97-AF65-F5344CB8AC3E}">
+        <p14:creationId xmlns:p14="http://schemas.microsoft.com/office/powerpoint/2010/main" val="3210521180"/>
+      </p:ext>
+    </p:extLst>
+  </p:cSld>
+  <p:clrMapOvr>
+    <a:masterClrMapping/>
+  </p:clrMapOvr>
+  <p:timing>
+    <p:tnLst>
+      <p:par>
+        <p:cTn id="1" dur="indefinite" restart="never" nodeType="tmRoot">
+          <p:childTnLst>
+            <p:seq concurrent="1" nextAc="seek">
+              <p:cTn id="2" dur="indefinite" nodeType="mainSeq">
+                <p:childTnLst>
+                  <p:par>
+                    <p:cTn id="3" fill="hold">
+                      <p:stCondLst>
+                        <p:cond delay="indefinite"/>
+                        <p:cond evt="onBegin" delay="0">
+                          <p:tn val="2"/>
+                        </p:cond>
+                      </p:stCondLst>
+                      <p:childTnLst>
+                        <p:par>
+                          <p:cTn id="4" fill="hold">
+                            <p:stCondLst>
+                              <p:cond delay="0"/>
+                            </p:stCondLst>
+                            <p:childTnLst>
+                              <p:par>
+                                <p:cTn id="5" presetID="10" presetClass="entr" presetSubtype="0" fill="hold" grpId="0" nodeType="withEffect">
                                   <p:stCondLst>
                                     <p:cond delay="0"/>
                                   </p:stCondLst>
@@ -3769,8 +4345,8 @@
         </p:nvSpPr>
         <p:spPr>
           <a:xfrm>
-            <a:off x="4429005" y="3105834"/>
-            <a:ext cx="3333990" cy="646331"/>
+            <a:off x="226503" y="192947"/>
+            <a:ext cx="3267176" cy="646331"/>
           </a:xfrm>
           <a:prstGeom prst="rect">
             <a:avLst/>
@@ -3782,7 +4358,6 @@
           </a:bodyPr>
           <a:lstStyle/>
           <a:p>
-            <a:pPr algn="ctr"/>
             <a:r>
               <a:rPr lang="ru-RU" sz="3600" b="1" dirty="0">
                 <a:solidFill>
@@ -3793,7 +4368,75 @@
                 </a:solidFill>
                 <a:latin typeface="Montserrat" panose="00000500000000000000" pitchFamily="2" charset="-52"/>
               </a:rPr>
-              <a:t>Вопросы судей</a:t>
+              <a:t>Суть проблемы</a:t>
+            </a:r>
+          </a:p>
+        </p:txBody>
+      </p:sp>
+      <p:sp>
+        <p:nvSpPr>
+          <p:cNvPr id="2" name="TextBox 1">
+            <a:extLst>
+              <a:ext uri="{FF2B5EF4-FFF2-40B4-BE49-F238E27FC236}">
+                <a16:creationId xmlns:a16="http://schemas.microsoft.com/office/drawing/2014/main" id="{0103A899-6D10-49E9-8A51-97CA9380A77D}"/>
+              </a:ext>
+            </a:extLst>
+          </p:cNvPr>
+          <p:cNvSpPr txBox="1"/>
+          <p:nvPr/>
+        </p:nvSpPr>
+        <p:spPr>
+          <a:xfrm>
+            <a:off x="791029" y="1757260"/>
+            <a:ext cx="10609942" cy="4549835"/>
+          </a:xfrm>
+          <a:prstGeom prst="rect">
+            <a:avLst/>
+          </a:prstGeom>
+          <a:noFill/>
+        </p:spPr>
+        <p:txBody>
+          <a:bodyPr wrap="square" rtlCol="0">
+            <a:spAutoFit/>
+          </a:bodyPr>
+          <a:lstStyle/>
+          <a:p>
+            <a:pPr>
+              <a:lnSpc>
+                <a:spcPct val="150000"/>
+              </a:lnSpc>
+            </a:pPr>
+            <a:r>
+              <a:rPr lang="ru-RU" sz="2800" dirty="0">
+                <a:latin typeface="Montserrat" panose="00000500000000000000" pitchFamily="2" charset="-52"/>
+              </a:rPr>
+              <a:t>Во многих учебных заведениях существует проблема. Нет возможности анонимно оставить отзыв о качестве образования.</a:t>
+            </a:r>
+          </a:p>
+          <a:p>
+            <a:pPr>
+              <a:lnSpc>
+                <a:spcPct val="150000"/>
+              </a:lnSpc>
+            </a:pPr>
+            <a:r>
+              <a:rPr lang="ru-RU" sz="2800" dirty="0">
+                <a:latin typeface="Montserrat" panose="00000500000000000000" pitchFamily="2" charset="-52"/>
+              </a:rPr>
+              <a:t>Сейчас всё это делается через посредников, что не гарантирует анонимность.</a:t>
+            </a:r>
+          </a:p>
+          <a:p>
+            <a:pPr>
+              <a:lnSpc>
+                <a:spcPct val="150000"/>
+              </a:lnSpc>
+            </a:pPr>
+            <a:r>
+              <a:rPr lang="ru-RU" sz="2800" dirty="0">
+                <a:latin typeface="Montserrat" panose="00000500000000000000" pitchFamily="2" charset="-52"/>
+              </a:rPr>
+              <a:t>Люди обидчивы, и например если отзыв будет касаться какого-либо преподавателя, в конечном итоге это может коснуться будущего студента оставившего отзыв.</a:t>
             </a:r>
           </a:p>
         </p:txBody>
@@ -3801,13 +4444,1448 @@
     </p:spTree>
     <p:extLst>
       <p:ext uri="{BB962C8B-B14F-4D97-AF65-F5344CB8AC3E}">
-        <p14:creationId xmlns:p14="http://schemas.microsoft.com/office/powerpoint/2010/main" val="2298706615"/>
+        <p14:creationId xmlns:p14="http://schemas.microsoft.com/office/powerpoint/2010/main" val="3481548332"/>
       </p:ext>
     </p:extLst>
   </p:cSld>
   <p:clrMapOvr>
     <a:masterClrMapping/>
   </p:clrMapOvr>
+  <p:timing>
+    <p:tnLst>
+      <p:par>
+        <p:cTn id="1" dur="indefinite" restart="never" nodeType="tmRoot">
+          <p:childTnLst>
+            <p:seq concurrent="1" nextAc="seek">
+              <p:cTn id="2" dur="indefinite" nodeType="mainSeq">
+                <p:childTnLst>
+                  <p:par>
+                    <p:cTn id="3" fill="hold">
+                      <p:stCondLst>
+                        <p:cond delay="indefinite"/>
+                        <p:cond evt="onBegin" delay="0">
+                          <p:tn val="2"/>
+                        </p:cond>
+                      </p:stCondLst>
+                      <p:childTnLst>
+                        <p:par>
+                          <p:cTn id="4" fill="hold">
+                            <p:stCondLst>
+                              <p:cond delay="0"/>
+                            </p:stCondLst>
+                            <p:childTnLst>
+                              <p:par>
+                                <p:cTn id="5" presetID="10" presetClass="entr" presetSubtype="0" fill="hold" grpId="0" nodeType="withEffect">
+                                  <p:stCondLst>
+                                    <p:cond delay="0"/>
+                                  </p:stCondLst>
+                                  <p:childTnLst>
+                                    <p:set>
+                                      <p:cBhvr>
+                                        <p:cTn id="6" dur="1" fill="hold">
+                                          <p:stCondLst>
+                                            <p:cond delay="0"/>
+                                          </p:stCondLst>
+                                        </p:cTn>
+                                        <p:tgtEl>
+                                          <p:spTgt spid="2"/>
+                                        </p:tgtEl>
+                                        <p:attrNameLst>
+                                          <p:attrName>style.visibility</p:attrName>
+                                        </p:attrNameLst>
+                                      </p:cBhvr>
+                                      <p:to>
+                                        <p:strVal val="visible"/>
+                                      </p:to>
+                                    </p:set>
+                                    <p:animEffect transition="in" filter="fade">
+                                      <p:cBhvr>
+                                        <p:cTn id="7" dur="1000"/>
+                                        <p:tgtEl>
+                                          <p:spTgt spid="2"/>
+                                        </p:tgtEl>
+                                      </p:cBhvr>
+                                    </p:animEffect>
+                                  </p:childTnLst>
+                                </p:cTn>
+                              </p:par>
+                            </p:childTnLst>
+                          </p:cTn>
+                        </p:par>
+                      </p:childTnLst>
+                    </p:cTn>
+                  </p:par>
+                </p:childTnLst>
+              </p:cTn>
+              <p:prevCondLst>
+                <p:cond evt="onPrev" delay="0">
+                  <p:tgtEl>
+                    <p:sldTgt/>
+                  </p:tgtEl>
+                </p:cond>
+              </p:prevCondLst>
+              <p:nextCondLst>
+                <p:cond evt="onNext" delay="0">
+                  <p:tgtEl>
+                    <p:sldTgt/>
+                  </p:tgtEl>
+                </p:cond>
+              </p:nextCondLst>
+            </p:seq>
+          </p:childTnLst>
+        </p:cTn>
+      </p:par>
+    </p:tnLst>
+    <p:bldLst>
+      <p:bldP spid="2" grpId="0"/>
+    </p:bldLst>
+  </p:timing>
+</p:sld>
+</file>
+
+<file path=ppt/slides/slide4.xml><?xml version="1.0" encoding="utf-8"?>
+<p:sld xmlns:a="http://schemas.openxmlformats.org/drawingml/2006/main" xmlns:r="http://schemas.openxmlformats.org/officeDocument/2006/relationships" xmlns:p="http://schemas.openxmlformats.org/presentationml/2006/main">
+  <p:cSld>
+    <p:spTree>
+      <p:nvGrpSpPr>
+        <p:cNvPr id="1" name=""/>
+        <p:cNvGrpSpPr/>
+        <p:nvPr/>
+      </p:nvGrpSpPr>
+      <p:grpSpPr>
+        <a:xfrm>
+          <a:off x="0" y="0"/>
+          <a:ext cx="0" cy="0"/>
+          <a:chOff x="0" y="0"/>
+          <a:chExt cx="0" cy="0"/>
+        </a:xfrm>
+      </p:grpSpPr>
+      <p:sp>
+        <p:nvSpPr>
+          <p:cNvPr id="4" name="Прямоугольник 3">
+            <a:extLst>
+              <a:ext uri="{FF2B5EF4-FFF2-40B4-BE49-F238E27FC236}">
+                <a16:creationId xmlns:a16="http://schemas.microsoft.com/office/drawing/2014/main" id="{D744DC60-29D7-4107-BF24-9CA85085F51D}"/>
+              </a:ext>
+            </a:extLst>
+          </p:cNvPr>
+          <p:cNvSpPr/>
+          <p:nvPr/>
+        </p:nvSpPr>
+        <p:spPr>
+          <a:xfrm>
+            <a:off x="226503" y="192947"/>
+            <a:ext cx="3199915" cy="646331"/>
+          </a:xfrm>
+          <a:prstGeom prst="rect">
+            <a:avLst/>
+          </a:prstGeom>
+        </p:spPr>
+        <p:txBody>
+          <a:bodyPr wrap="none">
+            <a:spAutoFit/>
+          </a:bodyPr>
+          <a:lstStyle/>
+          <a:p>
+            <a:r>
+              <a:rPr lang="ru-RU" sz="3600" b="1" dirty="0">
+                <a:solidFill>
+                  <a:schemeClr val="tx1">
+                    <a:lumMod val="50000"/>
+                    <a:lumOff val="50000"/>
+                  </a:schemeClr>
+                </a:solidFill>
+                <a:latin typeface="Montserrat" panose="00000500000000000000" pitchFamily="2" charset="-52"/>
+              </a:rPr>
+              <a:t>Наше решение</a:t>
+            </a:r>
+          </a:p>
+        </p:txBody>
+      </p:sp>
+      <p:sp>
+        <p:nvSpPr>
+          <p:cNvPr id="2" name="TextBox 1">
+            <a:extLst>
+              <a:ext uri="{FF2B5EF4-FFF2-40B4-BE49-F238E27FC236}">
+                <a16:creationId xmlns:a16="http://schemas.microsoft.com/office/drawing/2014/main" id="{0103A899-6D10-49E9-8A51-97CA9380A77D}"/>
+              </a:ext>
+            </a:extLst>
+          </p:cNvPr>
+          <p:cNvSpPr txBox="1"/>
+          <p:nvPr/>
+        </p:nvSpPr>
+        <p:spPr>
+          <a:xfrm>
+            <a:off x="791029" y="1757260"/>
+            <a:ext cx="5304971" cy="2610843"/>
+          </a:xfrm>
+          <a:prstGeom prst="rect">
+            <a:avLst/>
+          </a:prstGeom>
+          <a:noFill/>
+        </p:spPr>
+        <p:txBody>
+          <a:bodyPr wrap="square" rtlCol="0">
+            <a:spAutoFit/>
+          </a:bodyPr>
+          <a:lstStyle/>
+          <a:p>
+            <a:pPr>
+              <a:lnSpc>
+                <a:spcPct val="150000"/>
+              </a:lnSpc>
+            </a:pPr>
+            <a:r>
+              <a:rPr lang="ru-RU" sz="2800" dirty="0">
+                <a:latin typeface="Montserrat" panose="00000500000000000000" pitchFamily="2" charset="-52"/>
+              </a:rPr>
+              <a:t>Мы создали портал на котором любой авторизованный пользователь имеет возможность отправить отзыв.</a:t>
+            </a:r>
+          </a:p>
+        </p:txBody>
+      </p:sp>
+    </p:spTree>
+    <p:extLst>
+      <p:ext uri="{BB962C8B-B14F-4D97-AF65-F5344CB8AC3E}">
+        <p14:creationId xmlns:p14="http://schemas.microsoft.com/office/powerpoint/2010/main" val="2122385834"/>
+      </p:ext>
+    </p:extLst>
+  </p:cSld>
+  <p:clrMapOvr>
+    <a:masterClrMapping/>
+  </p:clrMapOvr>
+  <p:timing>
+    <p:tnLst>
+      <p:par>
+        <p:cTn id="1" dur="indefinite" restart="never" nodeType="tmRoot">
+          <p:childTnLst>
+            <p:seq concurrent="1" nextAc="seek">
+              <p:cTn id="2" dur="indefinite" nodeType="mainSeq">
+                <p:childTnLst>
+                  <p:par>
+                    <p:cTn id="3" fill="hold">
+                      <p:stCondLst>
+                        <p:cond delay="indefinite"/>
+                        <p:cond evt="onBegin" delay="0">
+                          <p:tn val="2"/>
+                        </p:cond>
+                      </p:stCondLst>
+                      <p:childTnLst>
+                        <p:par>
+                          <p:cTn id="4" fill="hold">
+                            <p:stCondLst>
+                              <p:cond delay="0"/>
+                            </p:stCondLst>
+                            <p:childTnLst>
+                              <p:par>
+                                <p:cTn id="5" presetID="10" presetClass="entr" presetSubtype="0" fill="hold" grpId="0" nodeType="withEffect">
+                                  <p:stCondLst>
+                                    <p:cond delay="0"/>
+                                  </p:stCondLst>
+                                  <p:childTnLst>
+                                    <p:set>
+                                      <p:cBhvr>
+                                        <p:cTn id="6" dur="1" fill="hold">
+                                          <p:stCondLst>
+                                            <p:cond delay="0"/>
+                                          </p:stCondLst>
+                                        </p:cTn>
+                                        <p:tgtEl>
+                                          <p:spTgt spid="2"/>
+                                        </p:tgtEl>
+                                        <p:attrNameLst>
+                                          <p:attrName>style.visibility</p:attrName>
+                                        </p:attrNameLst>
+                                      </p:cBhvr>
+                                      <p:to>
+                                        <p:strVal val="visible"/>
+                                      </p:to>
+                                    </p:set>
+                                    <p:animEffect transition="in" filter="fade">
+                                      <p:cBhvr>
+                                        <p:cTn id="7" dur="500"/>
+                                        <p:tgtEl>
+                                          <p:spTgt spid="2"/>
+                                        </p:tgtEl>
+                                      </p:cBhvr>
+                                    </p:animEffect>
+                                  </p:childTnLst>
+                                </p:cTn>
+                              </p:par>
+                            </p:childTnLst>
+                          </p:cTn>
+                        </p:par>
+                      </p:childTnLst>
+                    </p:cTn>
+                  </p:par>
+                </p:childTnLst>
+              </p:cTn>
+              <p:prevCondLst>
+                <p:cond evt="onPrev" delay="0">
+                  <p:tgtEl>
+                    <p:sldTgt/>
+                  </p:tgtEl>
+                </p:cond>
+              </p:prevCondLst>
+              <p:nextCondLst>
+                <p:cond evt="onNext" delay="0">
+                  <p:tgtEl>
+                    <p:sldTgt/>
+                  </p:tgtEl>
+                </p:cond>
+              </p:nextCondLst>
+            </p:seq>
+          </p:childTnLst>
+        </p:cTn>
+      </p:par>
+    </p:tnLst>
+    <p:bldLst>
+      <p:bldP spid="2" grpId="0"/>
+    </p:bldLst>
+  </p:timing>
+</p:sld>
+</file>
+
+<file path=ppt/slides/slide5.xml><?xml version="1.0" encoding="utf-8"?>
+<p:sld xmlns:a="http://schemas.openxmlformats.org/drawingml/2006/main" xmlns:r="http://schemas.openxmlformats.org/officeDocument/2006/relationships" xmlns:p="http://schemas.openxmlformats.org/presentationml/2006/main">
+  <p:cSld>
+    <p:spTree>
+      <p:nvGrpSpPr>
+        <p:cNvPr id="1" name=""/>
+        <p:cNvGrpSpPr/>
+        <p:nvPr/>
+      </p:nvGrpSpPr>
+      <p:grpSpPr>
+        <a:xfrm>
+          <a:off x="0" y="0"/>
+          <a:ext cx="0" cy="0"/>
+          <a:chOff x="0" y="0"/>
+          <a:chExt cx="0" cy="0"/>
+        </a:xfrm>
+      </p:grpSpPr>
+      <p:sp>
+        <p:nvSpPr>
+          <p:cNvPr id="4" name="Прямоугольник 3">
+            <a:extLst>
+              <a:ext uri="{FF2B5EF4-FFF2-40B4-BE49-F238E27FC236}">
+                <a16:creationId xmlns:a16="http://schemas.microsoft.com/office/drawing/2014/main" id="{D744DC60-29D7-4107-BF24-9CA85085F51D}"/>
+              </a:ext>
+            </a:extLst>
+          </p:cNvPr>
+          <p:cNvSpPr/>
+          <p:nvPr/>
+        </p:nvSpPr>
+        <p:spPr>
+          <a:xfrm>
+            <a:off x="226503" y="192947"/>
+            <a:ext cx="3199915" cy="646331"/>
+          </a:xfrm>
+          <a:prstGeom prst="rect">
+            <a:avLst/>
+          </a:prstGeom>
+        </p:spPr>
+        <p:txBody>
+          <a:bodyPr wrap="none">
+            <a:spAutoFit/>
+          </a:bodyPr>
+          <a:lstStyle/>
+          <a:p>
+            <a:r>
+              <a:rPr lang="ru-RU" sz="3600" b="1" dirty="0">
+                <a:solidFill>
+                  <a:schemeClr val="tx1">
+                    <a:lumMod val="50000"/>
+                    <a:lumOff val="50000"/>
+                  </a:schemeClr>
+                </a:solidFill>
+                <a:latin typeface="Montserrat" panose="00000500000000000000" pitchFamily="2" charset="-52"/>
+              </a:rPr>
+              <a:t>Наше решение</a:t>
+            </a:r>
+          </a:p>
+        </p:txBody>
+      </p:sp>
+      <p:sp>
+        <p:nvSpPr>
+          <p:cNvPr id="2" name="TextBox 1">
+            <a:extLst>
+              <a:ext uri="{FF2B5EF4-FFF2-40B4-BE49-F238E27FC236}">
+                <a16:creationId xmlns:a16="http://schemas.microsoft.com/office/drawing/2014/main" id="{0103A899-6D10-49E9-8A51-97CA9380A77D}"/>
+              </a:ext>
+            </a:extLst>
+          </p:cNvPr>
+          <p:cNvSpPr txBox="1"/>
+          <p:nvPr/>
+        </p:nvSpPr>
+        <p:spPr>
+          <a:xfrm>
+            <a:off x="791029" y="1757260"/>
+            <a:ext cx="5304971" cy="3257174"/>
+          </a:xfrm>
+          <a:prstGeom prst="rect">
+            <a:avLst/>
+          </a:prstGeom>
+          <a:noFill/>
+        </p:spPr>
+        <p:txBody>
+          <a:bodyPr wrap="square" rtlCol="0">
+            <a:spAutoFit/>
+          </a:bodyPr>
+          <a:lstStyle/>
+          <a:p>
+            <a:pPr>
+              <a:lnSpc>
+                <a:spcPct val="150000"/>
+              </a:lnSpc>
+            </a:pPr>
+            <a:r>
+              <a:rPr lang="ru-RU" sz="2800" dirty="0">
+                <a:latin typeface="Montserrat" panose="00000500000000000000" pitchFamily="2" charset="-52"/>
+              </a:rPr>
+              <a:t>Администраторы портала, могут просматривать отправленные отзывы, в будущем планируется добавить возможность отвечать на отзывы.</a:t>
+            </a:r>
+          </a:p>
+        </p:txBody>
+      </p:sp>
+    </p:spTree>
+    <p:extLst>
+      <p:ext uri="{BB962C8B-B14F-4D97-AF65-F5344CB8AC3E}">
+        <p14:creationId xmlns:p14="http://schemas.microsoft.com/office/powerpoint/2010/main" val="2759312029"/>
+      </p:ext>
+    </p:extLst>
+  </p:cSld>
+  <p:clrMapOvr>
+    <a:masterClrMapping/>
+  </p:clrMapOvr>
+  <p:timing>
+    <p:tnLst>
+      <p:par>
+        <p:cTn id="1" dur="indefinite" restart="never" nodeType="tmRoot">
+          <p:childTnLst>
+            <p:seq concurrent="1" nextAc="seek">
+              <p:cTn id="2" dur="indefinite" nodeType="mainSeq">
+                <p:childTnLst>
+                  <p:par>
+                    <p:cTn id="3" fill="hold">
+                      <p:stCondLst>
+                        <p:cond delay="indefinite"/>
+                        <p:cond evt="onBegin" delay="0">
+                          <p:tn val="2"/>
+                        </p:cond>
+                      </p:stCondLst>
+                      <p:childTnLst>
+                        <p:par>
+                          <p:cTn id="4" fill="hold">
+                            <p:stCondLst>
+                              <p:cond delay="0"/>
+                            </p:stCondLst>
+                            <p:childTnLst>
+                              <p:par>
+                                <p:cTn id="5" presetID="10" presetClass="entr" presetSubtype="0" fill="hold" grpId="0" nodeType="withEffect">
+                                  <p:stCondLst>
+                                    <p:cond delay="0"/>
+                                  </p:stCondLst>
+                                  <p:childTnLst>
+                                    <p:set>
+                                      <p:cBhvr>
+                                        <p:cTn id="6" dur="1" fill="hold">
+                                          <p:stCondLst>
+                                            <p:cond delay="0"/>
+                                          </p:stCondLst>
+                                        </p:cTn>
+                                        <p:tgtEl>
+                                          <p:spTgt spid="2"/>
+                                        </p:tgtEl>
+                                        <p:attrNameLst>
+                                          <p:attrName>style.visibility</p:attrName>
+                                        </p:attrNameLst>
+                                      </p:cBhvr>
+                                      <p:to>
+                                        <p:strVal val="visible"/>
+                                      </p:to>
+                                    </p:set>
+                                    <p:animEffect transition="in" filter="fade">
+                                      <p:cBhvr>
+                                        <p:cTn id="7" dur="1000"/>
+                                        <p:tgtEl>
+                                          <p:spTgt spid="2"/>
+                                        </p:tgtEl>
+                                      </p:cBhvr>
+                                    </p:animEffect>
+                                  </p:childTnLst>
+                                </p:cTn>
+                              </p:par>
+                            </p:childTnLst>
+                          </p:cTn>
+                        </p:par>
+                      </p:childTnLst>
+                    </p:cTn>
+                  </p:par>
+                </p:childTnLst>
+              </p:cTn>
+              <p:prevCondLst>
+                <p:cond evt="onPrev" delay="0">
+                  <p:tgtEl>
+                    <p:sldTgt/>
+                  </p:tgtEl>
+                </p:cond>
+              </p:prevCondLst>
+              <p:nextCondLst>
+                <p:cond evt="onNext" delay="0">
+                  <p:tgtEl>
+                    <p:sldTgt/>
+                  </p:tgtEl>
+                </p:cond>
+              </p:nextCondLst>
+            </p:seq>
+          </p:childTnLst>
+        </p:cTn>
+      </p:par>
+    </p:tnLst>
+    <p:bldLst>
+      <p:bldP spid="2" grpId="0"/>
+    </p:bldLst>
+  </p:timing>
+</p:sld>
+</file>
+
+<file path=ppt/slides/slide6.xml><?xml version="1.0" encoding="utf-8"?>
+<p:sld xmlns:a="http://schemas.openxmlformats.org/drawingml/2006/main" xmlns:r="http://schemas.openxmlformats.org/officeDocument/2006/relationships" xmlns:p="http://schemas.openxmlformats.org/presentationml/2006/main">
+  <p:cSld>
+    <p:spTree>
+      <p:nvGrpSpPr>
+        <p:cNvPr id="1" name=""/>
+        <p:cNvGrpSpPr/>
+        <p:nvPr/>
+      </p:nvGrpSpPr>
+      <p:grpSpPr>
+        <a:xfrm>
+          <a:off x="0" y="0"/>
+          <a:ext cx="0" cy="0"/>
+          <a:chOff x="0" y="0"/>
+          <a:chExt cx="0" cy="0"/>
+        </a:xfrm>
+      </p:grpSpPr>
+      <p:sp>
+        <p:nvSpPr>
+          <p:cNvPr id="4" name="Прямоугольник 3">
+            <a:extLst>
+              <a:ext uri="{FF2B5EF4-FFF2-40B4-BE49-F238E27FC236}">
+                <a16:creationId xmlns:a16="http://schemas.microsoft.com/office/drawing/2014/main" id="{D744DC60-29D7-4107-BF24-9CA85085F51D}"/>
+              </a:ext>
+            </a:extLst>
+          </p:cNvPr>
+          <p:cNvSpPr/>
+          <p:nvPr/>
+        </p:nvSpPr>
+        <p:spPr>
+          <a:xfrm>
+            <a:off x="226503" y="192947"/>
+            <a:ext cx="3199915" cy="646331"/>
+          </a:xfrm>
+          <a:prstGeom prst="rect">
+            <a:avLst/>
+          </a:prstGeom>
+        </p:spPr>
+        <p:txBody>
+          <a:bodyPr wrap="none">
+            <a:spAutoFit/>
+          </a:bodyPr>
+          <a:lstStyle/>
+          <a:p>
+            <a:r>
+              <a:rPr lang="ru-RU" sz="3600" b="1" dirty="0">
+                <a:solidFill>
+                  <a:schemeClr val="tx1">
+                    <a:lumMod val="50000"/>
+                    <a:lumOff val="50000"/>
+                  </a:schemeClr>
+                </a:solidFill>
+                <a:latin typeface="Montserrat" panose="00000500000000000000" pitchFamily="2" charset="-52"/>
+              </a:rPr>
+              <a:t>Наше решение</a:t>
+            </a:r>
+          </a:p>
+        </p:txBody>
+      </p:sp>
+      <p:sp>
+        <p:nvSpPr>
+          <p:cNvPr id="2" name="TextBox 1">
+            <a:extLst>
+              <a:ext uri="{FF2B5EF4-FFF2-40B4-BE49-F238E27FC236}">
+                <a16:creationId xmlns:a16="http://schemas.microsoft.com/office/drawing/2014/main" id="{0103A899-6D10-49E9-8A51-97CA9380A77D}"/>
+              </a:ext>
+            </a:extLst>
+          </p:cNvPr>
+          <p:cNvSpPr txBox="1"/>
+          <p:nvPr/>
+        </p:nvSpPr>
+        <p:spPr>
+          <a:xfrm>
+            <a:off x="791029" y="1757260"/>
+            <a:ext cx="5304971" cy="3257174"/>
+          </a:xfrm>
+          <a:prstGeom prst="rect">
+            <a:avLst/>
+          </a:prstGeom>
+          <a:noFill/>
+        </p:spPr>
+        <p:txBody>
+          <a:bodyPr wrap="square" rtlCol="0">
+            <a:spAutoFit/>
+          </a:bodyPr>
+          <a:lstStyle/>
+          <a:p>
+            <a:pPr>
+              <a:lnSpc>
+                <a:spcPct val="150000"/>
+              </a:lnSpc>
+            </a:pPr>
+            <a:r>
+              <a:rPr lang="ru-RU" sz="2800" dirty="0">
+                <a:latin typeface="Montserrat" panose="00000500000000000000" pitchFamily="2" charset="-52"/>
+              </a:rPr>
+              <a:t>Отзыв может быть абсолютно любой, а благодаря машинному обучению мы можем классифицировать его и понять позитивный он или негативный.</a:t>
+            </a:r>
+          </a:p>
+        </p:txBody>
+      </p:sp>
+    </p:spTree>
+    <p:extLst>
+      <p:ext uri="{BB962C8B-B14F-4D97-AF65-F5344CB8AC3E}">
+        <p14:creationId xmlns:p14="http://schemas.microsoft.com/office/powerpoint/2010/main" val="735196098"/>
+      </p:ext>
+    </p:extLst>
+  </p:cSld>
+  <p:clrMapOvr>
+    <a:masterClrMapping/>
+  </p:clrMapOvr>
+  <p:timing>
+    <p:tnLst>
+      <p:par>
+        <p:cTn id="1" dur="indefinite" restart="never" nodeType="tmRoot">
+          <p:childTnLst>
+            <p:seq concurrent="1" nextAc="seek">
+              <p:cTn id="2" dur="indefinite" nodeType="mainSeq">
+                <p:childTnLst>
+                  <p:par>
+                    <p:cTn id="3" fill="hold">
+                      <p:stCondLst>
+                        <p:cond delay="indefinite"/>
+                        <p:cond evt="onBegin" delay="0">
+                          <p:tn val="2"/>
+                        </p:cond>
+                      </p:stCondLst>
+                      <p:childTnLst>
+                        <p:par>
+                          <p:cTn id="4" fill="hold">
+                            <p:stCondLst>
+                              <p:cond delay="0"/>
+                            </p:stCondLst>
+                            <p:childTnLst>
+                              <p:par>
+                                <p:cTn id="5" presetID="10" presetClass="entr" presetSubtype="0" fill="hold" grpId="0" nodeType="withEffect">
+                                  <p:stCondLst>
+                                    <p:cond delay="0"/>
+                                  </p:stCondLst>
+                                  <p:childTnLst>
+                                    <p:set>
+                                      <p:cBhvr>
+                                        <p:cTn id="6" dur="1" fill="hold">
+                                          <p:stCondLst>
+                                            <p:cond delay="0"/>
+                                          </p:stCondLst>
+                                        </p:cTn>
+                                        <p:tgtEl>
+                                          <p:spTgt spid="2"/>
+                                        </p:tgtEl>
+                                        <p:attrNameLst>
+                                          <p:attrName>style.visibility</p:attrName>
+                                        </p:attrNameLst>
+                                      </p:cBhvr>
+                                      <p:to>
+                                        <p:strVal val="visible"/>
+                                      </p:to>
+                                    </p:set>
+                                    <p:animEffect transition="in" filter="fade">
+                                      <p:cBhvr>
+                                        <p:cTn id="7" dur="1000"/>
+                                        <p:tgtEl>
+                                          <p:spTgt spid="2"/>
+                                        </p:tgtEl>
+                                      </p:cBhvr>
+                                    </p:animEffect>
+                                  </p:childTnLst>
+                                </p:cTn>
+                              </p:par>
+                            </p:childTnLst>
+                          </p:cTn>
+                        </p:par>
+                      </p:childTnLst>
+                    </p:cTn>
+                  </p:par>
+                </p:childTnLst>
+              </p:cTn>
+              <p:prevCondLst>
+                <p:cond evt="onPrev" delay="0">
+                  <p:tgtEl>
+                    <p:sldTgt/>
+                  </p:tgtEl>
+                </p:cond>
+              </p:prevCondLst>
+              <p:nextCondLst>
+                <p:cond evt="onNext" delay="0">
+                  <p:tgtEl>
+                    <p:sldTgt/>
+                  </p:tgtEl>
+                </p:cond>
+              </p:nextCondLst>
+            </p:seq>
+          </p:childTnLst>
+        </p:cTn>
+      </p:par>
+    </p:tnLst>
+    <p:bldLst>
+      <p:bldP spid="2" grpId="0"/>
+    </p:bldLst>
+  </p:timing>
+</p:sld>
+</file>
+
+<file path=ppt/slides/slide7.xml><?xml version="1.0" encoding="utf-8"?>
+<p:sld xmlns:a="http://schemas.openxmlformats.org/drawingml/2006/main" xmlns:r="http://schemas.openxmlformats.org/officeDocument/2006/relationships" xmlns:p="http://schemas.openxmlformats.org/presentationml/2006/main">
+  <p:cSld>
+    <p:spTree>
+      <p:nvGrpSpPr>
+        <p:cNvPr id="1" name=""/>
+        <p:cNvGrpSpPr/>
+        <p:nvPr/>
+      </p:nvGrpSpPr>
+      <p:grpSpPr>
+        <a:xfrm>
+          <a:off x="0" y="0"/>
+          <a:ext cx="0" cy="0"/>
+          <a:chOff x="0" y="0"/>
+          <a:chExt cx="0" cy="0"/>
+        </a:xfrm>
+      </p:grpSpPr>
+      <p:sp>
+        <p:nvSpPr>
+          <p:cNvPr id="4" name="Прямоугольник 3">
+            <a:extLst>
+              <a:ext uri="{FF2B5EF4-FFF2-40B4-BE49-F238E27FC236}">
+                <a16:creationId xmlns:a16="http://schemas.microsoft.com/office/drawing/2014/main" id="{D744DC60-29D7-4107-BF24-9CA85085F51D}"/>
+              </a:ext>
+            </a:extLst>
+          </p:cNvPr>
+          <p:cNvSpPr/>
+          <p:nvPr/>
+        </p:nvSpPr>
+        <p:spPr>
+          <a:xfrm>
+            <a:off x="226503" y="192947"/>
+            <a:ext cx="3199915" cy="646331"/>
+          </a:xfrm>
+          <a:prstGeom prst="rect">
+            <a:avLst/>
+          </a:prstGeom>
+        </p:spPr>
+        <p:txBody>
+          <a:bodyPr wrap="none">
+            <a:spAutoFit/>
+          </a:bodyPr>
+          <a:lstStyle/>
+          <a:p>
+            <a:r>
+              <a:rPr lang="ru-RU" sz="3600" b="1" dirty="0">
+                <a:solidFill>
+                  <a:schemeClr val="tx1">
+                    <a:lumMod val="50000"/>
+                    <a:lumOff val="50000"/>
+                  </a:schemeClr>
+                </a:solidFill>
+                <a:latin typeface="Montserrat" panose="00000500000000000000" pitchFamily="2" charset="-52"/>
+              </a:rPr>
+              <a:t>Наше решение</a:t>
+            </a:r>
+          </a:p>
+        </p:txBody>
+      </p:sp>
+      <p:sp>
+        <p:nvSpPr>
+          <p:cNvPr id="2" name="TextBox 1">
+            <a:extLst>
+              <a:ext uri="{FF2B5EF4-FFF2-40B4-BE49-F238E27FC236}">
+                <a16:creationId xmlns:a16="http://schemas.microsoft.com/office/drawing/2014/main" id="{0103A899-6D10-49E9-8A51-97CA9380A77D}"/>
+              </a:ext>
+            </a:extLst>
+          </p:cNvPr>
+          <p:cNvSpPr txBox="1"/>
+          <p:nvPr/>
+        </p:nvSpPr>
+        <p:spPr>
+          <a:xfrm>
+            <a:off x="791029" y="1757260"/>
+            <a:ext cx="5304971" cy="3903504"/>
+          </a:xfrm>
+          <a:prstGeom prst="rect">
+            <a:avLst/>
+          </a:prstGeom>
+          <a:noFill/>
+        </p:spPr>
+        <p:txBody>
+          <a:bodyPr wrap="square" rtlCol="0">
+            <a:spAutoFit/>
+          </a:bodyPr>
+          <a:lstStyle/>
+          <a:p>
+            <a:pPr>
+              <a:lnSpc>
+                <a:spcPct val="150000"/>
+              </a:lnSpc>
+            </a:pPr>
+            <a:r>
+              <a:rPr lang="ru-RU" sz="2800" dirty="0">
+                <a:latin typeface="Montserrat" panose="00000500000000000000" pitchFamily="2" charset="-52"/>
+              </a:rPr>
+              <a:t>Добавили навык в </a:t>
+            </a:r>
+            <a:r>
+              <a:rPr lang="ru-RU" sz="2800" dirty="0" err="1">
+                <a:latin typeface="Montserrat" panose="00000500000000000000" pitchFamily="2" charset="-52"/>
+              </a:rPr>
+              <a:t>Яндекс.Станцию</a:t>
+            </a:r>
+            <a:r>
+              <a:rPr lang="ru-RU" sz="2800" dirty="0">
+                <a:latin typeface="Montserrat" panose="00000500000000000000" pitchFamily="2" charset="-52"/>
+              </a:rPr>
+              <a:t> где вы можете в голосовой форме оставить отзыв. Просто, потому что мы можем это сделать, ну а вдруг это удобно.</a:t>
+            </a:r>
+          </a:p>
+        </p:txBody>
+      </p:sp>
+    </p:spTree>
+    <p:extLst>
+      <p:ext uri="{BB962C8B-B14F-4D97-AF65-F5344CB8AC3E}">
+        <p14:creationId xmlns:p14="http://schemas.microsoft.com/office/powerpoint/2010/main" val="2212685182"/>
+      </p:ext>
+    </p:extLst>
+  </p:cSld>
+  <p:clrMapOvr>
+    <a:masterClrMapping/>
+  </p:clrMapOvr>
+  <p:timing>
+    <p:tnLst>
+      <p:par>
+        <p:cTn id="1" dur="indefinite" restart="never" nodeType="tmRoot">
+          <p:childTnLst>
+            <p:seq concurrent="1" nextAc="seek">
+              <p:cTn id="2" dur="indefinite" nodeType="mainSeq">
+                <p:childTnLst>
+                  <p:par>
+                    <p:cTn id="3" fill="hold">
+                      <p:stCondLst>
+                        <p:cond delay="indefinite"/>
+                        <p:cond evt="onBegin" delay="0">
+                          <p:tn val="2"/>
+                        </p:cond>
+                      </p:stCondLst>
+                      <p:childTnLst>
+                        <p:par>
+                          <p:cTn id="4" fill="hold">
+                            <p:stCondLst>
+                              <p:cond delay="0"/>
+                            </p:stCondLst>
+                            <p:childTnLst>
+                              <p:par>
+                                <p:cTn id="5" presetID="10" presetClass="entr" presetSubtype="0" fill="hold" grpId="0" nodeType="withEffect">
+                                  <p:stCondLst>
+                                    <p:cond delay="0"/>
+                                  </p:stCondLst>
+                                  <p:childTnLst>
+                                    <p:set>
+                                      <p:cBhvr>
+                                        <p:cTn id="6" dur="1" fill="hold">
+                                          <p:stCondLst>
+                                            <p:cond delay="0"/>
+                                          </p:stCondLst>
+                                        </p:cTn>
+                                        <p:tgtEl>
+                                          <p:spTgt spid="2"/>
+                                        </p:tgtEl>
+                                        <p:attrNameLst>
+                                          <p:attrName>style.visibility</p:attrName>
+                                        </p:attrNameLst>
+                                      </p:cBhvr>
+                                      <p:to>
+                                        <p:strVal val="visible"/>
+                                      </p:to>
+                                    </p:set>
+                                    <p:animEffect transition="in" filter="fade">
+                                      <p:cBhvr>
+                                        <p:cTn id="7" dur="1000"/>
+                                        <p:tgtEl>
+                                          <p:spTgt spid="2"/>
+                                        </p:tgtEl>
+                                      </p:cBhvr>
+                                    </p:animEffect>
+                                  </p:childTnLst>
+                                </p:cTn>
+                              </p:par>
+                            </p:childTnLst>
+                          </p:cTn>
+                        </p:par>
+                      </p:childTnLst>
+                    </p:cTn>
+                  </p:par>
+                </p:childTnLst>
+              </p:cTn>
+              <p:prevCondLst>
+                <p:cond evt="onPrev" delay="0">
+                  <p:tgtEl>
+                    <p:sldTgt/>
+                  </p:tgtEl>
+                </p:cond>
+              </p:prevCondLst>
+              <p:nextCondLst>
+                <p:cond evt="onNext" delay="0">
+                  <p:tgtEl>
+                    <p:sldTgt/>
+                  </p:tgtEl>
+                </p:cond>
+              </p:nextCondLst>
+            </p:seq>
+          </p:childTnLst>
+        </p:cTn>
+      </p:par>
+    </p:tnLst>
+    <p:bldLst>
+      <p:bldP spid="2" grpId="0"/>
+    </p:bldLst>
+  </p:timing>
+</p:sld>
+</file>
+
+<file path=ppt/slides/slide8.xml><?xml version="1.0" encoding="utf-8"?>
+<p:sld xmlns:a="http://schemas.openxmlformats.org/drawingml/2006/main" xmlns:r="http://schemas.openxmlformats.org/officeDocument/2006/relationships" xmlns:p="http://schemas.openxmlformats.org/presentationml/2006/main">
+  <p:cSld>
+    <p:spTree>
+      <p:nvGrpSpPr>
+        <p:cNvPr id="1" name=""/>
+        <p:cNvGrpSpPr/>
+        <p:nvPr/>
+      </p:nvGrpSpPr>
+      <p:grpSpPr>
+        <a:xfrm>
+          <a:off x="0" y="0"/>
+          <a:ext cx="0" cy="0"/>
+          <a:chOff x="0" y="0"/>
+          <a:chExt cx="0" cy="0"/>
+        </a:xfrm>
+      </p:grpSpPr>
+      <p:sp>
+        <p:nvSpPr>
+          <p:cNvPr id="4" name="Прямоугольник 3">
+            <a:extLst>
+              <a:ext uri="{FF2B5EF4-FFF2-40B4-BE49-F238E27FC236}">
+                <a16:creationId xmlns:a16="http://schemas.microsoft.com/office/drawing/2014/main" id="{D744DC60-29D7-4107-BF24-9CA85085F51D}"/>
+              </a:ext>
+            </a:extLst>
+          </p:cNvPr>
+          <p:cNvSpPr/>
+          <p:nvPr/>
+        </p:nvSpPr>
+        <p:spPr>
+          <a:xfrm>
+            <a:off x="226503" y="192947"/>
+            <a:ext cx="3199915" cy="646331"/>
+          </a:xfrm>
+          <a:prstGeom prst="rect">
+            <a:avLst/>
+          </a:prstGeom>
+        </p:spPr>
+        <p:txBody>
+          <a:bodyPr wrap="none">
+            <a:spAutoFit/>
+          </a:bodyPr>
+          <a:lstStyle/>
+          <a:p>
+            <a:r>
+              <a:rPr lang="ru-RU" sz="3600" b="1" dirty="0">
+                <a:solidFill>
+                  <a:schemeClr val="tx1">
+                    <a:lumMod val="50000"/>
+                    <a:lumOff val="50000"/>
+                  </a:schemeClr>
+                </a:solidFill>
+                <a:latin typeface="Montserrat" panose="00000500000000000000" pitchFamily="2" charset="-52"/>
+              </a:rPr>
+              <a:t>Наше решение</a:t>
+            </a:r>
+          </a:p>
+        </p:txBody>
+      </p:sp>
+      <p:sp>
+        <p:nvSpPr>
+          <p:cNvPr id="2" name="TextBox 1">
+            <a:extLst>
+              <a:ext uri="{FF2B5EF4-FFF2-40B4-BE49-F238E27FC236}">
+                <a16:creationId xmlns:a16="http://schemas.microsoft.com/office/drawing/2014/main" id="{0103A899-6D10-49E9-8A51-97CA9380A77D}"/>
+              </a:ext>
+            </a:extLst>
+          </p:cNvPr>
+          <p:cNvSpPr txBox="1"/>
+          <p:nvPr/>
+        </p:nvSpPr>
+        <p:spPr>
+          <a:xfrm>
+            <a:off x="791029" y="1757260"/>
+            <a:ext cx="5304971" cy="3257174"/>
+          </a:xfrm>
+          <a:prstGeom prst="rect">
+            <a:avLst/>
+          </a:prstGeom>
+          <a:noFill/>
+        </p:spPr>
+        <p:txBody>
+          <a:bodyPr wrap="square" rtlCol="0">
+            <a:spAutoFit/>
+          </a:bodyPr>
+          <a:lstStyle/>
+          <a:p>
+            <a:pPr>
+              <a:lnSpc>
+                <a:spcPct val="150000"/>
+              </a:lnSpc>
+            </a:pPr>
+            <a:r>
+              <a:rPr lang="ru-RU" sz="2800" dirty="0">
+                <a:latin typeface="Montserrat" panose="00000500000000000000" pitchFamily="2" charset="-52"/>
+              </a:rPr>
+              <a:t>Приятным бонусом стало наше </a:t>
+            </a:r>
+            <a:r>
+              <a:rPr lang="ru-RU" sz="2800" dirty="0" err="1">
+                <a:latin typeface="Montserrat" panose="00000500000000000000" pitchFamily="2" charset="-52"/>
+              </a:rPr>
+              <a:t>Android</a:t>
+            </a:r>
+            <a:r>
+              <a:rPr lang="ru-RU" sz="2800" dirty="0">
+                <a:latin typeface="Montserrat" panose="00000500000000000000" pitchFamily="2" charset="-52"/>
+              </a:rPr>
+              <a:t> приложение с личным кабинетом, расписанием и возможностью отправить фидбек используя приложения.</a:t>
+            </a:r>
+          </a:p>
+        </p:txBody>
+      </p:sp>
+      <p:pic>
+        <p:nvPicPr>
+          <p:cNvPr id="5" name="Рисунок 4">
+            <a:extLst>
+              <a:ext uri="{FF2B5EF4-FFF2-40B4-BE49-F238E27FC236}">
+                <a16:creationId xmlns:a16="http://schemas.microsoft.com/office/drawing/2014/main" id="{4F3AFB2F-33BE-412C-ACBA-163B356E68B6}"/>
+              </a:ext>
+            </a:extLst>
+          </p:cNvPr>
+          <p:cNvPicPr>
+            <a:picLocks noChangeAspect="1"/>
+          </p:cNvPicPr>
+          <p:nvPr/>
+        </p:nvPicPr>
+        <p:blipFill>
+          <a:blip r:embed="rId2"/>
+          <a:stretch>
+            <a:fillRect/>
+          </a:stretch>
+        </p:blipFill>
+        <p:spPr>
+          <a:xfrm>
+            <a:off x="7971971" y="0"/>
+            <a:ext cx="3429000" cy="6858000"/>
+          </a:xfrm>
+          <a:prstGeom prst="rect">
+            <a:avLst/>
+          </a:prstGeom>
+        </p:spPr>
+      </p:pic>
+    </p:spTree>
+    <p:extLst>
+      <p:ext uri="{BB962C8B-B14F-4D97-AF65-F5344CB8AC3E}">
+        <p14:creationId xmlns:p14="http://schemas.microsoft.com/office/powerpoint/2010/main" val="1186862278"/>
+      </p:ext>
+    </p:extLst>
+  </p:cSld>
+  <p:clrMapOvr>
+    <a:masterClrMapping/>
+  </p:clrMapOvr>
+  <p:timing>
+    <p:tnLst>
+      <p:par>
+        <p:cTn id="1" dur="indefinite" restart="never" nodeType="tmRoot">
+          <p:childTnLst>
+            <p:seq concurrent="1" nextAc="seek">
+              <p:cTn id="2" dur="indefinite" nodeType="mainSeq">
+                <p:childTnLst>
+                  <p:par>
+                    <p:cTn id="3" fill="hold">
+                      <p:stCondLst>
+                        <p:cond delay="indefinite"/>
+                        <p:cond evt="onBegin" delay="0">
+                          <p:tn val="2"/>
+                        </p:cond>
+                      </p:stCondLst>
+                      <p:childTnLst>
+                        <p:par>
+                          <p:cTn id="4" fill="hold">
+                            <p:stCondLst>
+                              <p:cond delay="0"/>
+                            </p:stCondLst>
+                            <p:childTnLst>
+                              <p:par>
+                                <p:cTn id="5" presetID="10" presetClass="entr" presetSubtype="0" fill="hold" grpId="0" nodeType="afterEffect">
+                                  <p:stCondLst>
+                                    <p:cond delay="0"/>
+                                  </p:stCondLst>
+                                  <p:childTnLst>
+                                    <p:set>
+                                      <p:cBhvr>
+                                        <p:cTn id="6" dur="1" fill="hold">
+                                          <p:stCondLst>
+                                            <p:cond delay="0"/>
+                                          </p:stCondLst>
+                                        </p:cTn>
+                                        <p:tgtEl>
+                                          <p:spTgt spid="2"/>
+                                        </p:tgtEl>
+                                        <p:attrNameLst>
+                                          <p:attrName>style.visibility</p:attrName>
+                                        </p:attrNameLst>
+                                      </p:cBhvr>
+                                      <p:to>
+                                        <p:strVal val="visible"/>
+                                      </p:to>
+                                    </p:set>
+                                    <p:animEffect transition="in" filter="fade">
+                                      <p:cBhvr>
+                                        <p:cTn id="7" dur="1000"/>
+                                        <p:tgtEl>
+                                          <p:spTgt spid="2"/>
+                                        </p:tgtEl>
+                                      </p:cBhvr>
+                                    </p:animEffect>
+                                  </p:childTnLst>
+                                </p:cTn>
+                              </p:par>
+                              <p:par>
+                                <p:cTn id="8" presetID="10" presetClass="entr" presetSubtype="0" fill="hold" nodeType="withEffect">
+                                  <p:stCondLst>
+                                    <p:cond delay="0"/>
+                                  </p:stCondLst>
+                                  <p:childTnLst>
+                                    <p:set>
+                                      <p:cBhvr>
+                                        <p:cTn id="9" dur="1" fill="hold">
+                                          <p:stCondLst>
+                                            <p:cond delay="0"/>
+                                          </p:stCondLst>
+                                        </p:cTn>
+                                        <p:tgtEl>
+                                          <p:spTgt spid="5"/>
+                                        </p:tgtEl>
+                                        <p:attrNameLst>
+                                          <p:attrName>style.visibility</p:attrName>
+                                        </p:attrNameLst>
+                                      </p:cBhvr>
+                                      <p:to>
+                                        <p:strVal val="visible"/>
+                                      </p:to>
+                                    </p:set>
+                                    <p:animEffect transition="in" filter="fade">
+                                      <p:cBhvr>
+                                        <p:cTn id="10" dur="500"/>
+                                        <p:tgtEl>
+                                          <p:spTgt spid="5"/>
+                                        </p:tgtEl>
+                                      </p:cBhvr>
+                                    </p:animEffect>
+                                  </p:childTnLst>
+                                </p:cTn>
+                              </p:par>
+                            </p:childTnLst>
+                          </p:cTn>
+                        </p:par>
+                      </p:childTnLst>
+                    </p:cTn>
+                  </p:par>
+                </p:childTnLst>
+              </p:cTn>
+              <p:prevCondLst>
+                <p:cond evt="onPrev" delay="0">
+                  <p:tgtEl>
+                    <p:sldTgt/>
+                  </p:tgtEl>
+                </p:cond>
+              </p:prevCondLst>
+              <p:nextCondLst>
+                <p:cond evt="onNext" delay="0">
+                  <p:tgtEl>
+                    <p:sldTgt/>
+                  </p:tgtEl>
+                </p:cond>
+              </p:nextCondLst>
+            </p:seq>
+          </p:childTnLst>
+        </p:cTn>
+      </p:par>
+    </p:tnLst>
+    <p:bldLst>
+      <p:bldP spid="2" grpId="0"/>
+    </p:bldLst>
+  </p:timing>
+</p:sld>
+</file>
+
+<file path=ppt/slides/slide9.xml><?xml version="1.0" encoding="utf-8"?>
+<p:sld xmlns:a="http://schemas.openxmlformats.org/drawingml/2006/main" xmlns:r="http://schemas.openxmlformats.org/officeDocument/2006/relationships" xmlns:p="http://schemas.openxmlformats.org/presentationml/2006/main">
+  <p:cSld>
+    <p:spTree>
+      <p:nvGrpSpPr>
+        <p:cNvPr id="1" name=""/>
+        <p:cNvGrpSpPr/>
+        <p:nvPr/>
+      </p:nvGrpSpPr>
+      <p:grpSpPr>
+        <a:xfrm>
+          <a:off x="0" y="0"/>
+          <a:ext cx="0" cy="0"/>
+          <a:chOff x="0" y="0"/>
+          <a:chExt cx="0" cy="0"/>
+        </a:xfrm>
+      </p:grpSpPr>
+      <p:sp>
+        <p:nvSpPr>
+          <p:cNvPr id="4" name="Прямоугольник 3">
+            <a:extLst>
+              <a:ext uri="{FF2B5EF4-FFF2-40B4-BE49-F238E27FC236}">
+                <a16:creationId xmlns:a16="http://schemas.microsoft.com/office/drawing/2014/main" id="{D744DC60-29D7-4107-BF24-9CA85085F51D}"/>
+              </a:ext>
+            </a:extLst>
+          </p:cNvPr>
+          <p:cNvSpPr/>
+          <p:nvPr/>
+        </p:nvSpPr>
+        <p:spPr>
+          <a:xfrm>
+            <a:off x="226503" y="192947"/>
+            <a:ext cx="3199915" cy="646331"/>
+          </a:xfrm>
+          <a:prstGeom prst="rect">
+            <a:avLst/>
+          </a:prstGeom>
+        </p:spPr>
+        <p:txBody>
+          <a:bodyPr wrap="none">
+            <a:spAutoFit/>
+          </a:bodyPr>
+          <a:lstStyle/>
+          <a:p>
+            <a:r>
+              <a:rPr lang="ru-RU" sz="3600" b="1" dirty="0">
+                <a:solidFill>
+                  <a:schemeClr val="tx1">
+                    <a:lumMod val="50000"/>
+                    <a:lumOff val="50000"/>
+                  </a:schemeClr>
+                </a:solidFill>
+                <a:latin typeface="Montserrat" panose="00000500000000000000" pitchFamily="2" charset="-52"/>
+              </a:rPr>
+              <a:t>Наше решение</a:t>
+            </a:r>
+          </a:p>
+        </p:txBody>
+      </p:sp>
+      <p:sp>
+        <p:nvSpPr>
+          <p:cNvPr id="2" name="TextBox 1">
+            <a:extLst>
+              <a:ext uri="{FF2B5EF4-FFF2-40B4-BE49-F238E27FC236}">
+                <a16:creationId xmlns:a16="http://schemas.microsoft.com/office/drawing/2014/main" id="{0103A899-6D10-49E9-8A51-97CA9380A77D}"/>
+              </a:ext>
+            </a:extLst>
+          </p:cNvPr>
+          <p:cNvSpPr txBox="1"/>
+          <p:nvPr/>
+        </p:nvSpPr>
+        <p:spPr>
+          <a:xfrm>
+            <a:off x="791029" y="1757260"/>
+            <a:ext cx="5304971" cy="3257174"/>
+          </a:xfrm>
+          <a:prstGeom prst="rect">
+            <a:avLst/>
+          </a:prstGeom>
+          <a:noFill/>
+        </p:spPr>
+        <p:txBody>
+          <a:bodyPr wrap="square" rtlCol="0">
+            <a:spAutoFit/>
+          </a:bodyPr>
+          <a:lstStyle/>
+          <a:p>
+            <a:pPr>
+              <a:lnSpc>
+                <a:spcPct val="150000"/>
+              </a:lnSpc>
+            </a:pPr>
+            <a:r>
+              <a:rPr lang="ru-RU" sz="2800" dirty="0">
+                <a:latin typeface="Montserrat" panose="00000500000000000000" pitchFamily="2" charset="-52"/>
+              </a:rPr>
+              <a:t>Приятным бонусом стало наше </a:t>
+            </a:r>
+            <a:r>
+              <a:rPr lang="ru-RU" sz="2800" dirty="0" err="1">
+                <a:latin typeface="Montserrat" panose="00000500000000000000" pitchFamily="2" charset="-52"/>
+              </a:rPr>
+              <a:t>Android</a:t>
+            </a:r>
+            <a:r>
+              <a:rPr lang="ru-RU" sz="2800" dirty="0">
+                <a:latin typeface="Montserrat" panose="00000500000000000000" pitchFamily="2" charset="-52"/>
+              </a:rPr>
+              <a:t> приложение с личным кабинетом, расписанием и возможностью отправить фидбек используя приложения.</a:t>
+            </a:r>
+          </a:p>
+        </p:txBody>
+      </p:sp>
+      <p:pic>
+        <p:nvPicPr>
+          <p:cNvPr id="5" name="Рисунок 4">
+            <a:extLst>
+              <a:ext uri="{FF2B5EF4-FFF2-40B4-BE49-F238E27FC236}">
+                <a16:creationId xmlns:a16="http://schemas.microsoft.com/office/drawing/2014/main" id="{5E5DA5FB-C3DC-4DAF-99EF-D5597C8A1597}"/>
+              </a:ext>
+            </a:extLst>
+          </p:cNvPr>
+          <p:cNvPicPr>
+            <a:picLocks noChangeAspect="1"/>
+          </p:cNvPicPr>
+          <p:nvPr/>
+        </p:nvPicPr>
+        <p:blipFill>
+          <a:blip r:embed="rId2"/>
+          <a:stretch>
+            <a:fillRect/>
+          </a:stretch>
+        </p:blipFill>
+        <p:spPr>
+          <a:xfrm>
+            <a:off x="7971971" y="0"/>
+            <a:ext cx="3429000" cy="6858000"/>
+          </a:xfrm>
+          <a:prstGeom prst="rect">
+            <a:avLst/>
+          </a:prstGeom>
+        </p:spPr>
+      </p:pic>
+    </p:spTree>
+    <p:extLst>
+      <p:ext uri="{BB962C8B-B14F-4D97-AF65-F5344CB8AC3E}">
+        <p14:creationId xmlns:p14="http://schemas.microsoft.com/office/powerpoint/2010/main" val="2124366008"/>
+      </p:ext>
+    </p:extLst>
+  </p:cSld>
+  <p:clrMapOvr>
+    <a:masterClrMapping/>
+  </p:clrMapOvr>
+  <p:timing>
+    <p:tnLst>
+      <p:par>
+        <p:cTn id="1" dur="indefinite" restart="never" nodeType="tmRoot">
+          <p:childTnLst>
+            <p:seq concurrent="1" nextAc="seek">
+              <p:cTn id="2" dur="indefinite" nodeType="mainSeq">
+                <p:childTnLst>
+                  <p:par>
+                    <p:cTn id="3" fill="hold">
+                      <p:stCondLst>
+                        <p:cond delay="indefinite"/>
+                        <p:cond evt="onBegin" delay="0">
+                          <p:tn val="2"/>
+                        </p:cond>
+                      </p:stCondLst>
+                      <p:childTnLst>
+                        <p:par>
+                          <p:cTn id="4" fill="hold">
+                            <p:stCondLst>
+                              <p:cond delay="0"/>
+                            </p:stCondLst>
+                            <p:childTnLst>
+                              <p:par>
+                                <p:cTn id="5" presetID="10" presetClass="entr" presetSubtype="0" fill="hold" nodeType="withEffect">
+                                  <p:stCondLst>
+                                    <p:cond delay="0"/>
+                                  </p:stCondLst>
+                                  <p:childTnLst>
+                                    <p:set>
+                                      <p:cBhvr>
+                                        <p:cTn id="6" dur="1" fill="hold">
+                                          <p:stCondLst>
+                                            <p:cond delay="0"/>
+                                          </p:stCondLst>
+                                        </p:cTn>
+                                        <p:tgtEl>
+                                          <p:spTgt spid="5"/>
+                                        </p:tgtEl>
+                                        <p:attrNameLst>
+                                          <p:attrName>style.visibility</p:attrName>
+                                        </p:attrNameLst>
+                                      </p:cBhvr>
+                                      <p:to>
+                                        <p:strVal val="visible"/>
+                                      </p:to>
+                                    </p:set>
+                                    <p:animEffect transition="in" filter="fade">
+                                      <p:cBhvr>
+                                        <p:cTn id="7" dur="500"/>
+                                        <p:tgtEl>
+                                          <p:spTgt spid="5"/>
+                                        </p:tgtEl>
+                                      </p:cBhvr>
+                                    </p:animEffect>
+                                  </p:childTnLst>
+                                </p:cTn>
+                              </p:par>
+                            </p:childTnLst>
+                          </p:cTn>
+                        </p:par>
+                      </p:childTnLst>
+                    </p:cTn>
+                  </p:par>
+                </p:childTnLst>
+              </p:cTn>
+              <p:prevCondLst>
+                <p:cond evt="onPrev" delay="0">
+                  <p:tgtEl>
+                    <p:sldTgt/>
+                  </p:tgtEl>
+                </p:cond>
+              </p:prevCondLst>
+              <p:nextCondLst>
+                <p:cond evt="onNext" delay="0">
+                  <p:tgtEl>
+                    <p:sldTgt/>
+                  </p:tgtEl>
+                </p:cond>
+              </p:nextCondLst>
+            </p:seq>
+          </p:childTnLst>
+        </p:cTn>
+      </p:par>
+    </p:tnLst>
+  </p:timing>
 </p:sld>
 </file>
 

</xml_diff>